<commit_message>
intermedite update to remove some watermarks
</commit_message>
<xml_diff>
--- a/figures/figure 2/figure_2.pptx
+++ b/figures/figure 2/figure_2.pptx
@@ -104,6 +104,11 @@
       </a:defRPr>
     </a:lvl9pPr>
   </p:defaultTextStyle>
+  <p:extLst>
+    <p:ext uri="{EFAFB233-063F-42B5-8137-9DF3F51BA10A}">
+      <p15:sldGuideLst xmlns:p15="http://schemas.microsoft.com/office/powerpoint/2012/main"/>
+    </p:ext>
+  </p:extLst>
 </p:presentation>
 </file>
 
@@ -254,7 +259,7 @@
           <a:p>
             <a:fld id="{56CA7F0D-375C-2F47-BB4D-C9F4824FD9A5}" type="datetimeFigureOut">
               <a:rPr lang="en-US" smtClean="0"/>
-              <a:t>12/3/21</a:t>
+              <a:t>12/7/21</a:t>
             </a:fld>
             <a:endParaRPr lang="en-US"/>
           </a:p>
@@ -452,7 +457,7 @@
           <a:p>
             <a:fld id="{56CA7F0D-375C-2F47-BB4D-C9F4824FD9A5}" type="datetimeFigureOut">
               <a:rPr lang="en-US" smtClean="0"/>
-              <a:t>12/3/21</a:t>
+              <a:t>12/7/21</a:t>
             </a:fld>
             <a:endParaRPr lang="en-US"/>
           </a:p>
@@ -660,7 +665,7 @@
           <a:p>
             <a:fld id="{56CA7F0D-375C-2F47-BB4D-C9F4824FD9A5}" type="datetimeFigureOut">
               <a:rPr lang="en-US" smtClean="0"/>
-              <a:t>12/3/21</a:t>
+              <a:t>12/7/21</a:t>
             </a:fld>
             <a:endParaRPr lang="en-US"/>
           </a:p>
@@ -858,7 +863,7 @@
           <a:p>
             <a:fld id="{56CA7F0D-375C-2F47-BB4D-C9F4824FD9A5}" type="datetimeFigureOut">
               <a:rPr lang="en-US" smtClean="0"/>
-              <a:t>12/3/21</a:t>
+              <a:t>12/7/21</a:t>
             </a:fld>
             <a:endParaRPr lang="en-US"/>
           </a:p>
@@ -1133,7 +1138,7 @@
           <a:p>
             <a:fld id="{56CA7F0D-375C-2F47-BB4D-C9F4824FD9A5}" type="datetimeFigureOut">
               <a:rPr lang="en-US" smtClean="0"/>
-              <a:t>12/3/21</a:t>
+              <a:t>12/7/21</a:t>
             </a:fld>
             <a:endParaRPr lang="en-US"/>
           </a:p>
@@ -1398,7 +1403,7 @@
           <a:p>
             <a:fld id="{56CA7F0D-375C-2F47-BB4D-C9F4824FD9A5}" type="datetimeFigureOut">
               <a:rPr lang="en-US" smtClean="0"/>
-              <a:t>12/3/21</a:t>
+              <a:t>12/7/21</a:t>
             </a:fld>
             <a:endParaRPr lang="en-US"/>
           </a:p>
@@ -1810,7 +1815,7 @@
           <a:p>
             <a:fld id="{56CA7F0D-375C-2F47-BB4D-C9F4824FD9A5}" type="datetimeFigureOut">
               <a:rPr lang="en-US" smtClean="0"/>
-              <a:t>12/3/21</a:t>
+              <a:t>12/7/21</a:t>
             </a:fld>
             <a:endParaRPr lang="en-US"/>
           </a:p>
@@ -1951,7 +1956,7 @@
           <a:p>
             <a:fld id="{56CA7F0D-375C-2F47-BB4D-C9F4824FD9A5}" type="datetimeFigureOut">
               <a:rPr lang="en-US" smtClean="0"/>
-              <a:t>12/3/21</a:t>
+              <a:t>12/7/21</a:t>
             </a:fld>
             <a:endParaRPr lang="en-US"/>
           </a:p>
@@ -2064,7 +2069,7 @@
           <a:p>
             <a:fld id="{56CA7F0D-375C-2F47-BB4D-C9F4824FD9A5}" type="datetimeFigureOut">
               <a:rPr lang="en-US" smtClean="0"/>
-              <a:t>12/3/21</a:t>
+              <a:t>12/7/21</a:t>
             </a:fld>
             <a:endParaRPr lang="en-US"/>
           </a:p>
@@ -2375,7 +2380,7 @@
           <a:p>
             <a:fld id="{56CA7F0D-375C-2F47-BB4D-C9F4824FD9A5}" type="datetimeFigureOut">
               <a:rPr lang="en-US" smtClean="0"/>
-              <a:t>12/3/21</a:t>
+              <a:t>12/7/21</a:t>
             </a:fld>
             <a:endParaRPr lang="en-US"/>
           </a:p>
@@ -2663,7 +2668,7 @@
           <a:p>
             <a:fld id="{56CA7F0D-375C-2F47-BB4D-C9F4824FD9A5}" type="datetimeFigureOut">
               <a:rPr lang="en-US" smtClean="0"/>
-              <a:t>12/3/21</a:t>
+              <a:t>12/7/21</a:t>
             </a:fld>
             <a:endParaRPr lang="en-US"/>
           </a:p>
@@ -2904,7 +2909,7 @@
           <a:p>
             <a:fld id="{56CA7F0D-375C-2F47-BB4D-C9F4824FD9A5}" type="datetimeFigureOut">
               <a:rPr lang="en-US" smtClean="0"/>
-              <a:t>12/3/21</a:t>
+              <a:t>12/7/21</a:t>
             </a:fld>
             <a:endParaRPr lang="en-US"/>
           </a:p>
@@ -3323,10 +3328,10 @@
       </p:grpSpPr>
       <p:pic>
         <p:nvPicPr>
-          <p:cNvPr id="5" name="Picture 4">
-            <a:extLst>
-              <a:ext uri="{FF2B5EF4-FFF2-40B4-BE49-F238E27FC236}">
-                <a16:creationId xmlns:a16="http://schemas.microsoft.com/office/drawing/2014/main" id="{06D53D95-AA05-E749-B9F2-ECD9B75627C7}"/>
+          <p:cNvPr id="3" name="Picture 2">
+            <a:extLst>
+              <a:ext uri="{FF2B5EF4-FFF2-40B4-BE49-F238E27FC236}">
+                <a16:creationId xmlns:a16="http://schemas.microsoft.com/office/drawing/2014/main" id="{09845725-49BE-2742-BCE2-80EEC9F86472}"/>
               </a:ext>
             </a:extLst>
           </p:cNvPr>

</xml_diff>

<commit_message>
primarily, figure renumbering was performed to be consistent with the order of their appearance in the final draft. minor edits for cleanliness and the removal of figure captions (per journal's request) were made.
</commit_message>
<xml_diff>
--- a/figures/figure 2/figure_2.pptx
+++ b/figures/figure 2/figure_2.pptx
@@ -259,7 +259,7 @@
           <a:p>
             <a:fld id="{56CA7F0D-375C-2F47-BB4D-C9F4824FD9A5}" type="datetimeFigureOut">
               <a:rPr lang="en-US" smtClean="0"/>
-              <a:t>12/7/21</a:t>
+              <a:t>5/3/22</a:t>
             </a:fld>
             <a:endParaRPr lang="en-US"/>
           </a:p>
@@ -457,7 +457,7 @@
           <a:p>
             <a:fld id="{56CA7F0D-375C-2F47-BB4D-C9F4824FD9A5}" type="datetimeFigureOut">
               <a:rPr lang="en-US" smtClean="0"/>
-              <a:t>12/7/21</a:t>
+              <a:t>5/3/22</a:t>
             </a:fld>
             <a:endParaRPr lang="en-US"/>
           </a:p>
@@ -665,7 +665,7 @@
           <a:p>
             <a:fld id="{56CA7F0D-375C-2F47-BB4D-C9F4824FD9A5}" type="datetimeFigureOut">
               <a:rPr lang="en-US" smtClean="0"/>
-              <a:t>12/7/21</a:t>
+              <a:t>5/3/22</a:t>
             </a:fld>
             <a:endParaRPr lang="en-US"/>
           </a:p>
@@ -863,7 +863,7 @@
           <a:p>
             <a:fld id="{56CA7F0D-375C-2F47-BB4D-C9F4824FD9A5}" type="datetimeFigureOut">
               <a:rPr lang="en-US" smtClean="0"/>
-              <a:t>12/7/21</a:t>
+              <a:t>5/3/22</a:t>
             </a:fld>
             <a:endParaRPr lang="en-US"/>
           </a:p>
@@ -1138,7 +1138,7 @@
           <a:p>
             <a:fld id="{56CA7F0D-375C-2F47-BB4D-C9F4824FD9A5}" type="datetimeFigureOut">
               <a:rPr lang="en-US" smtClean="0"/>
-              <a:t>12/7/21</a:t>
+              <a:t>5/3/22</a:t>
             </a:fld>
             <a:endParaRPr lang="en-US"/>
           </a:p>
@@ -1403,7 +1403,7 @@
           <a:p>
             <a:fld id="{56CA7F0D-375C-2F47-BB4D-C9F4824FD9A5}" type="datetimeFigureOut">
               <a:rPr lang="en-US" smtClean="0"/>
-              <a:t>12/7/21</a:t>
+              <a:t>5/3/22</a:t>
             </a:fld>
             <a:endParaRPr lang="en-US"/>
           </a:p>
@@ -1815,7 +1815,7 @@
           <a:p>
             <a:fld id="{56CA7F0D-375C-2F47-BB4D-C9F4824FD9A5}" type="datetimeFigureOut">
               <a:rPr lang="en-US" smtClean="0"/>
-              <a:t>12/7/21</a:t>
+              <a:t>5/3/22</a:t>
             </a:fld>
             <a:endParaRPr lang="en-US"/>
           </a:p>
@@ -1956,7 +1956,7 @@
           <a:p>
             <a:fld id="{56CA7F0D-375C-2F47-BB4D-C9F4824FD9A5}" type="datetimeFigureOut">
               <a:rPr lang="en-US" smtClean="0"/>
-              <a:t>12/7/21</a:t>
+              <a:t>5/3/22</a:t>
             </a:fld>
             <a:endParaRPr lang="en-US"/>
           </a:p>
@@ -2069,7 +2069,7 @@
           <a:p>
             <a:fld id="{56CA7F0D-375C-2F47-BB4D-C9F4824FD9A5}" type="datetimeFigureOut">
               <a:rPr lang="en-US" smtClean="0"/>
-              <a:t>12/7/21</a:t>
+              <a:t>5/3/22</a:t>
             </a:fld>
             <a:endParaRPr lang="en-US"/>
           </a:p>
@@ -2380,7 +2380,7 @@
           <a:p>
             <a:fld id="{56CA7F0D-375C-2F47-BB4D-C9F4824FD9A5}" type="datetimeFigureOut">
               <a:rPr lang="en-US" smtClean="0"/>
-              <a:t>12/7/21</a:t>
+              <a:t>5/3/22</a:t>
             </a:fld>
             <a:endParaRPr lang="en-US"/>
           </a:p>
@@ -2668,7 +2668,7 @@
           <a:p>
             <a:fld id="{56CA7F0D-375C-2F47-BB4D-C9F4824FD9A5}" type="datetimeFigureOut">
               <a:rPr lang="en-US" smtClean="0"/>
-              <a:t>12/7/21</a:t>
+              <a:t>5/3/22</a:t>
             </a:fld>
             <a:endParaRPr lang="en-US"/>
           </a:p>
@@ -2909,7 +2909,7 @@
           <a:p>
             <a:fld id="{56CA7F0D-375C-2F47-BB4D-C9F4824FD9A5}" type="datetimeFigureOut">
               <a:rPr lang="en-US" smtClean="0"/>
-              <a:t>12/7/21</a:t>
+              <a:t>5/3/22</a:t>
             </a:fld>
             <a:endParaRPr lang="en-US"/>
           </a:p>
@@ -3342,9 +3342,8 @@
         </p:nvPicPr>
         <p:blipFill>
           <a:blip r:embed="rId2"/>
-          <a:stretch>
-            <a:fillRect/>
-          </a:stretch>
+          <a:srcRect/>
+          <a:stretch/>
         </p:blipFill>
         <p:spPr>
           <a:xfrm>
@@ -3370,7 +3369,7 @@
         </p:nvSpPr>
         <p:spPr>
           <a:xfrm>
-            <a:off x="3783724" y="1177160"/>
+            <a:off x="3783724" y="1226855"/>
             <a:ext cx="631904" cy="215444"/>
           </a:xfrm>
           <a:prstGeom prst="rect">
@@ -3409,7 +3408,7 @@
         </p:nvSpPr>
         <p:spPr>
           <a:xfrm>
-            <a:off x="4734910" y="1177160"/>
+            <a:off x="4734910" y="1226855"/>
             <a:ext cx="562975" cy="215444"/>
           </a:xfrm>
           <a:prstGeom prst="rect">
@@ -3448,7 +3447,7 @@
         </p:nvSpPr>
         <p:spPr>
           <a:xfrm>
-            <a:off x="7630510" y="961716"/>
+            <a:off x="7630510" y="1011411"/>
             <a:ext cx="511679" cy="215444"/>
           </a:xfrm>
           <a:prstGeom prst="rect">
@@ -3487,7 +3486,7 @@
         </p:nvSpPr>
         <p:spPr>
           <a:xfrm>
-            <a:off x="3769887" y="2624936"/>
+            <a:off x="3769887" y="2734265"/>
             <a:ext cx="631904" cy="215444"/>
           </a:xfrm>
           <a:prstGeom prst="rect">
@@ -3526,7 +3525,7 @@
         </p:nvSpPr>
         <p:spPr>
           <a:xfrm>
-            <a:off x="4721073" y="2624936"/>
+            <a:off x="4721073" y="2734265"/>
             <a:ext cx="562975" cy="215444"/>
           </a:xfrm>
           <a:prstGeom prst="rect">
@@ -3565,7 +3564,7 @@
         </p:nvSpPr>
         <p:spPr>
           <a:xfrm>
-            <a:off x="7630509" y="2283368"/>
+            <a:off x="7630509" y="2333063"/>
             <a:ext cx="511679" cy="215444"/>
           </a:xfrm>
           <a:prstGeom prst="rect">
@@ -3604,7 +3603,7 @@
         </p:nvSpPr>
         <p:spPr>
           <a:xfrm>
-            <a:off x="3769883" y="4097719"/>
+            <a:off x="3769883" y="4147414"/>
             <a:ext cx="631904" cy="215444"/>
           </a:xfrm>
           <a:prstGeom prst="rect">
@@ -3643,7 +3642,7 @@
         </p:nvSpPr>
         <p:spPr>
           <a:xfrm>
-            <a:off x="4721069" y="4097719"/>
+            <a:off x="4721069" y="4147414"/>
             <a:ext cx="562975" cy="215444"/>
           </a:xfrm>
           <a:prstGeom prst="rect">
@@ -3682,7 +3681,7 @@
         </p:nvSpPr>
         <p:spPr>
           <a:xfrm>
-            <a:off x="7616669" y="3882275"/>
+            <a:off x="7616669" y="4031360"/>
             <a:ext cx="511679" cy="215444"/>
           </a:xfrm>
           <a:prstGeom prst="rect">

</xml_diff>